<commit_message>
Added BDI wilcoxon tests
</commit_message>
<xml_diff>
--- a/EDA_04-07-2023_0_57.pptx
+++ b/EDA_04-07-2023_0_57.pptx
@@ -7077,7 +7077,7 @@
             <a:pPr algn="ctr"/>
             <a:r>
               <a:rPr lang="en-US" dirty="0"/>
-              <a:t>Physiological features  </a:t>
+              <a:t>Treatment Impact on Physiological features  </a:t>
             </a:r>
           </a:p>
         </p:txBody>
@@ -7308,20 +7308,20 @@
         </p:nvSpPr>
         <p:spPr>
           <a:xfrm>
-            <a:off x="311700" y="107461"/>
-            <a:ext cx="8520600" cy="572700"/>
+            <a:off x="311700" y="-15004"/>
+            <a:ext cx="8520600" cy="587400"/>
           </a:xfrm>
         </p:spPr>
         <p:txBody>
           <a:bodyPr>
-            <a:normAutofit fontScale="90000"/>
+            <a:normAutofit/>
           </a:bodyPr>
           <a:lstStyle/>
           <a:p>
             <a:pPr algn="ctr"/>
             <a:r>
-              <a:rPr lang="en-US" dirty="0"/>
-              <a:t>Mental features  </a:t>
+              <a:rPr lang="en-US" sz="2400" dirty="0"/>
+              <a:t>Treatment Impact on mental features  </a:t>
             </a:r>
           </a:p>
         </p:txBody>
@@ -7348,98 +7348,8 @@
         </p:blipFill>
         <p:spPr>
           <a:xfrm>
-            <a:off x="2021215" y="1078630"/>
+            <a:off x="2021215" y="1062302"/>
             <a:ext cx="1795713" cy="1986240"/>
-          </a:xfrm>
-          <a:prstGeom prst="rect">
-            <a:avLst/>
-          </a:prstGeom>
-        </p:spPr>
-      </p:pic>
-      <p:pic>
-        <p:nvPicPr>
-          <p:cNvPr id="11" name="Picture 10">
-            <a:extLst>
-              <a:ext uri="{FF2B5EF4-FFF2-40B4-BE49-F238E27FC236}">
-                <a16:creationId xmlns:a16="http://schemas.microsoft.com/office/drawing/2014/main" id="{1EB1CD18-4E2A-50BA-F180-94082C484826}"/>
-              </a:ext>
-            </a:extLst>
-          </p:cNvPr>
-          <p:cNvPicPr>
-            <a:picLocks noChangeAspect="1"/>
-          </p:cNvPicPr>
-          <p:nvPr/>
-        </p:nvPicPr>
-        <p:blipFill>
-          <a:blip r:embed="rId3"/>
-          <a:stretch>
-            <a:fillRect/>
-          </a:stretch>
-        </p:blipFill>
-        <p:spPr>
-          <a:xfrm>
-            <a:off x="4660962" y="1094372"/>
-            <a:ext cx="1629003" cy="1981477"/>
-          </a:xfrm>
-          <a:prstGeom prst="rect">
-            <a:avLst/>
-          </a:prstGeom>
-        </p:spPr>
-      </p:pic>
-      <p:pic>
-        <p:nvPicPr>
-          <p:cNvPr id="13" name="Picture 12">
-            <a:extLst>
-              <a:ext uri="{FF2B5EF4-FFF2-40B4-BE49-F238E27FC236}">
-                <a16:creationId xmlns:a16="http://schemas.microsoft.com/office/drawing/2014/main" id="{89304A39-96FD-E667-8085-82767431C214}"/>
-              </a:ext>
-            </a:extLst>
-          </p:cNvPr>
-          <p:cNvPicPr>
-            <a:picLocks noChangeAspect="1"/>
-          </p:cNvPicPr>
-          <p:nvPr/>
-        </p:nvPicPr>
-        <p:blipFill>
-          <a:blip r:embed="rId4"/>
-          <a:stretch>
-            <a:fillRect/>
-          </a:stretch>
-        </p:blipFill>
-        <p:spPr>
-          <a:xfrm>
-            <a:off x="2021215" y="3125775"/>
-            <a:ext cx="1786187" cy="1991003"/>
-          </a:xfrm>
-          <a:prstGeom prst="rect">
-            <a:avLst/>
-          </a:prstGeom>
-        </p:spPr>
-      </p:pic>
-      <p:pic>
-        <p:nvPicPr>
-          <p:cNvPr id="15" name="Picture 14">
-            <a:extLst>
-              <a:ext uri="{FF2B5EF4-FFF2-40B4-BE49-F238E27FC236}">
-                <a16:creationId xmlns:a16="http://schemas.microsoft.com/office/drawing/2014/main" id="{EF6F4CE2-D777-4745-85A1-14EF03432B94}"/>
-              </a:ext>
-            </a:extLst>
-          </p:cNvPr>
-          <p:cNvPicPr>
-            <a:picLocks noChangeAspect="1"/>
-          </p:cNvPicPr>
-          <p:nvPr/>
-        </p:nvPicPr>
-        <p:blipFill>
-          <a:blip r:embed="rId5"/>
-          <a:stretch>
-            <a:fillRect/>
-          </a:stretch>
-        </p:blipFill>
-        <p:spPr>
-          <a:xfrm>
-            <a:off x="4660962" y="3157260"/>
-            <a:ext cx="1633766" cy="1986240"/>
           </a:xfrm>
           <a:prstGeom prst="rect">
             <a:avLst/>
@@ -7460,7 +7370,7 @@
         </p:nvSpPr>
         <p:spPr>
           <a:xfrm>
-            <a:off x="2333749" y="537961"/>
+            <a:off x="896457" y="817345"/>
             <a:ext cx="1405483" cy="307777"/>
           </a:xfrm>
           <a:prstGeom prst="rect">
@@ -7498,7 +7408,7 @@
         <p:spPr>
           <a:xfrm>
             <a:off x="2833462" y="863836"/>
-            <a:ext cx="1405483" cy="307777"/>
+            <a:ext cx="1405483" cy="246221"/>
           </a:xfrm>
           <a:prstGeom prst="rect">
             <a:avLst/>
@@ -7513,10 +7423,10 @@
           <a:p>
             <a:pPr algn="ctr"/>
             <a:r>
-              <a:rPr lang="en-US" dirty="0"/>
+              <a:rPr lang="en-US" sz="1000" dirty="0"/>
               <a:t>p=0.0153</a:t>
             </a:r>
-            <a:endParaRPr lang="en-IL" dirty="0"/>
+            <a:endParaRPr lang="en-IL" sz="1000" dirty="0"/>
           </a:p>
         </p:txBody>
       </p:sp>
@@ -7535,7 +7445,7 @@
         <p:spPr>
           <a:xfrm>
             <a:off x="1842016" y="850019"/>
-            <a:ext cx="1405483" cy="307777"/>
+            <a:ext cx="1405483" cy="246221"/>
           </a:xfrm>
           <a:prstGeom prst="rect">
             <a:avLst/>
@@ -7550,13 +7460,351 @@
           <a:p>
             <a:pPr algn="ctr"/>
             <a:r>
-              <a:rPr lang="en-US" dirty="0"/>
+              <a:rPr lang="en-US" sz="1000" dirty="0"/>
               <a:t>p=0.2598</a:t>
             </a:r>
-            <a:endParaRPr lang="en-IL" dirty="0"/>
+            <a:endParaRPr lang="en-IL" sz="1000" dirty="0"/>
           </a:p>
         </p:txBody>
       </p:sp>
+      <p:sp>
+        <p:nvSpPr>
+          <p:cNvPr id="4" name="TextBox 3">
+            <a:extLst>
+              <a:ext uri="{FF2B5EF4-FFF2-40B4-BE49-F238E27FC236}">
+                <a16:creationId xmlns:a16="http://schemas.microsoft.com/office/drawing/2014/main" id="{841FA8A3-8179-8C80-DF14-ED8F7E0038AA}"/>
+              </a:ext>
+            </a:extLst>
+          </p:cNvPr>
+          <p:cNvSpPr txBox="1"/>
+          <p:nvPr/>
+        </p:nvSpPr>
+        <p:spPr>
+          <a:xfrm>
+            <a:off x="2127939" y="601278"/>
+            <a:ext cx="991446" cy="246221"/>
+          </a:xfrm>
+          <a:prstGeom prst="rect">
+            <a:avLst/>
+          </a:prstGeom>
+          <a:noFill/>
+        </p:spPr>
+        <p:txBody>
+          <a:bodyPr wrap="square" rtlCol="0">
+            <a:spAutoFit/>
+          </a:bodyPr>
+          <a:lstStyle/>
+          <a:p>
+            <a:pPr algn="ctr"/>
+            <a:r>
+              <a:rPr lang="en-US" sz="1000" b="1" dirty="0"/>
+              <a:t>Anxiety</a:t>
+            </a:r>
+            <a:endParaRPr lang="en-IL" sz="1000" b="1" dirty="0"/>
+          </a:p>
+        </p:txBody>
+      </p:sp>
+      <p:sp>
+        <p:nvSpPr>
+          <p:cNvPr id="5" name="TextBox 4">
+            <a:extLst>
+              <a:ext uri="{FF2B5EF4-FFF2-40B4-BE49-F238E27FC236}">
+                <a16:creationId xmlns:a16="http://schemas.microsoft.com/office/drawing/2014/main" id="{346062AA-F902-CC3F-2180-D215FC9CF10E}"/>
+              </a:ext>
+            </a:extLst>
+          </p:cNvPr>
+          <p:cNvSpPr txBox="1"/>
+          <p:nvPr/>
+        </p:nvSpPr>
+        <p:spPr>
+          <a:xfrm>
+            <a:off x="2878215" y="606931"/>
+            <a:ext cx="1265859" cy="246221"/>
+          </a:xfrm>
+          <a:prstGeom prst="rect">
+            <a:avLst/>
+          </a:prstGeom>
+          <a:noFill/>
+        </p:spPr>
+        <p:txBody>
+          <a:bodyPr wrap="square" rtlCol="0">
+            <a:spAutoFit/>
+          </a:bodyPr>
+          <a:lstStyle/>
+          <a:p>
+            <a:pPr algn="ctr"/>
+            <a:r>
+              <a:rPr lang="en-US" sz="1000" b="1" dirty="0"/>
+              <a:t>Depression</a:t>
+            </a:r>
+            <a:endParaRPr lang="en-IL" sz="1000" b="1" dirty="0"/>
+          </a:p>
+        </p:txBody>
+      </p:sp>
+      <p:grpSp>
+        <p:nvGrpSpPr>
+          <p:cNvPr id="17" name="Group 16">
+            <a:extLst>
+              <a:ext uri="{FF2B5EF4-FFF2-40B4-BE49-F238E27FC236}">
+                <a16:creationId xmlns:a16="http://schemas.microsoft.com/office/drawing/2014/main" id="{3B906159-04A3-40F7-8AF5-DFA639E8F54E}"/>
+              </a:ext>
+            </a:extLst>
+          </p:cNvPr>
+          <p:cNvGrpSpPr/>
+          <p:nvPr/>
+        </p:nvGrpSpPr>
+        <p:grpSpPr>
+          <a:xfrm>
+            <a:off x="4660962" y="2998759"/>
+            <a:ext cx="1633766" cy="2161069"/>
+            <a:chOff x="4660962" y="2998759"/>
+            <a:chExt cx="1633766" cy="2161069"/>
+          </a:xfrm>
+        </p:grpSpPr>
+        <p:pic>
+          <p:nvPicPr>
+            <p:cNvPr id="15" name="Picture 14">
+              <a:extLst>
+                <a:ext uri="{FF2B5EF4-FFF2-40B4-BE49-F238E27FC236}">
+                  <a16:creationId xmlns:a16="http://schemas.microsoft.com/office/drawing/2014/main" id="{EF6F4CE2-D777-4745-85A1-14EF03432B94}"/>
+                </a:ext>
+              </a:extLst>
+            </p:cNvPr>
+            <p:cNvPicPr>
+              <a:picLocks noChangeAspect="1"/>
+            </p:cNvPicPr>
+            <p:nvPr/>
+          </p:nvPicPr>
+          <p:blipFill>
+            <a:blip r:embed="rId3"/>
+            <a:stretch>
+              <a:fillRect/>
+            </a:stretch>
+          </p:blipFill>
+          <p:spPr>
+            <a:xfrm>
+              <a:off x="4660962" y="3173588"/>
+              <a:ext cx="1633766" cy="1986240"/>
+            </a:xfrm>
+            <a:prstGeom prst="rect">
+              <a:avLst/>
+            </a:prstGeom>
+          </p:spPr>
+        </p:pic>
+        <p:sp>
+          <p:nvSpPr>
+            <p:cNvPr id="10" name="TextBox 9">
+              <a:extLst>
+                <a:ext uri="{FF2B5EF4-FFF2-40B4-BE49-F238E27FC236}">
+                  <a16:creationId xmlns:a16="http://schemas.microsoft.com/office/drawing/2014/main" id="{AB3DA3CC-428C-0898-D5F5-97F54B565AC5}"/>
+                </a:ext>
+              </a:extLst>
+            </p:cNvPr>
+            <p:cNvSpPr txBox="1"/>
+            <p:nvPr/>
+          </p:nvSpPr>
+          <p:spPr>
+            <a:xfrm>
+              <a:off x="5024106" y="2998759"/>
+              <a:ext cx="1265859" cy="246221"/>
+            </a:xfrm>
+            <a:prstGeom prst="rect">
+              <a:avLst/>
+            </a:prstGeom>
+            <a:noFill/>
+          </p:spPr>
+          <p:txBody>
+            <a:bodyPr wrap="square" rtlCol="0">
+              <a:spAutoFit/>
+            </a:bodyPr>
+            <a:lstStyle/>
+            <a:p>
+              <a:pPr algn="ctr"/>
+              <a:r>
+                <a:rPr lang="en-US" sz="1000" dirty="0"/>
+                <a:t>Depression</a:t>
+              </a:r>
+              <a:endParaRPr lang="en-IL" sz="1000" dirty="0"/>
+            </a:p>
+          </p:txBody>
+        </p:sp>
+      </p:grpSp>
+      <p:grpSp>
+        <p:nvGrpSpPr>
+          <p:cNvPr id="16" name="Group 15">
+            <a:extLst>
+              <a:ext uri="{FF2B5EF4-FFF2-40B4-BE49-F238E27FC236}">
+                <a16:creationId xmlns:a16="http://schemas.microsoft.com/office/drawing/2014/main" id="{97352279-0BF2-E984-1902-6348D2796881}"/>
+              </a:ext>
+            </a:extLst>
+          </p:cNvPr>
+          <p:cNvGrpSpPr/>
+          <p:nvPr/>
+        </p:nvGrpSpPr>
+        <p:grpSpPr>
+          <a:xfrm>
+            <a:off x="4660962" y="853996"/>
+            <a:ext cx="1606553" cy="2170055"/>
+            <a:chOff x="4660962" y="853996"/>
+            <a:chExt cx="1606553" cy="2170055"/>
+          </a:xfrm>
+        </p:grpSpPr>
+        <p:pic>
+          <p:nvPicPr>
+            <p:cNvPr id="11" name="Picture 10">
+              <a:extLst>
+                <a:ext uri="{FF2B5EF4-FFF2-40B4-BE49-F238E27FC236}">
+                  <a16:creationId xmlns:a16="http://schemas.microsoft.com/office/drawing/2014/main" id="{1EB1CD18-4E2A-50BA-F180-94082C484826}"/>
+                </a:ext>
+              </a:extLst>
+            </p:cNvPr>
+            <p:cNvPicPr>
+              <a:picLocks noChangeAspect="1"/>
+            </p:cNvPicPr>
+            <p:nvPr/>
+          </p:nvPicPr>
+          <p:blipFill>
+            <a:blip r:embed="rId4"/>
+            <a:stretch>
+              <a:fillRect/>
+            </a:stretch>
+          </p:blipFill>
+          <p:spPr>
+            <a:xfrm>
+              <a:off x="4660962" y="1069881"/>
+              <a:ext cx="1606553" cy="1954170"/>
+            </a:xfrm>
+            <a:prstGeom prst="rect">
+              <a:avLst/>
+            </a:prstGeom>
+          </p:spPr>
+        </p:pic>
+        <p:sp>
+          <p:nvSpPr>
+            <p:cNvPr id="12" name="TextBox 11">
+              <a:extLst>
+                <a:ext uri="{FF2B5EF4-FFF2-40B4-BE49-F238E27FC236}">
+                  <a16:creationId xmlns:a16="http://schemas.microsoft.com/office/drawing/2014/main" id="{F992226D-4573-6C4A-0F5F-ED24C78892FE}"/>
+                </a:ext>
+              </a:extLst>
+            </p:cNvPr>
+            <p:cNvSpPr txBox="1"/>
+            <p:nvPr/>
+          </p:nvSpPr>
+          <p:spPr>
+            <a:xfrm>
+              <a:off x="4988108" y="853996"/>
+              <a:ext cx="1265859" cy="246221"/>
+            </a:xfrm>
+            <a:prstGeom prst="rect">
+              <a:avLst/>
+            </a:prstGeom>
+            <a:noFill/>
+          </p:spPr>
+          <p:txBody>
+            <a:bodyPr wrap="square" rtlCol="0">
+              <a:spAutoFit/>
+            </a:bodyPr>
+            <a:lstStyle/>
+            <a:p>
+              <a:pPr algn="ctr"/>
+              <a:r>
+                <a:rPr lang="en-US" sz="1000" dirty="0"/>
+                <a:t>Depression</a:t>
+              </a:r>
+              <a:endParaRPr lang="en-IL" sz="1000" dirty="0"/>
+            </a:p>
+          </p:txBody>
+        </p:sp>
+      </p:grpSp>
+      <p:grpSp>
+        <p:nvGrpSpPr>
+          <p:cNvPr id="18" name="Group 17">
+            <a:extLst>
+              <a:ext uri="{FF2B5EF4-FFF2-40B4-BE49-F238E27FC236}">
+                <a16:creationId xmlns:a16="http://schemas.microsoft.com/office/drawing/2014/main" id="{20136BF5-A43D-EC4E-20EA-68DA49DB64BE}"/>
+              </a:ext>
+            </a:extLst>
+          </p:cNvPr>
+          <p:cNvGrpSpPr/>
+          <p:nvPr/>
+        </p:nvGrpSpPr>
+        <p:grpSpPr>
+          <a:xfrm>
+            <a:off x="2021215" y="2980376"/>
+            <a:ext cx="1786187" cy="2152730"/>
+            <a:chOff x="2021215" y="2980376"/>
+            <a:chExt cx="1786187" cy="2152730"/>
+          </a:xfrm>
+        </p:grpSpPr>
+        <p:pic>
+          <p:nvPicPr>
+            <p:cNvPr id="13" name="Picture 12">
+              <a:extLst>
+                <a:ext uri="{FF2B5EF4-FFF2-40B4-BE49-F238E27FC236}">
+                  <a16:creationId xmlns:a16="http://schemas.microsoft.com/office/drawing/2014/main" id="{89304A39-96FD-E667-8085-82767431C214}"/>
+                </a:ext>
+              </a:extLst>
+            </p:cNvPr>
+            <p:cNvPicPr>
+              <a:picLocks noChangeAspect="1"/>
+            </p:cNvPicPr>
+            <p:nvPr/>
+          </p:nvPicPr>
+          <p:blipFill>
+            <a:blip r:embed="rId5"/>
+            <a:stretch>
+              <a:fillRect/>
+            </a:stretch>
+          </p:blipFill>
+          <p:spPr>
+            <a:xfrm>
+              <a:off x="2021215" y="3142103"/>
+              <a:ext cx="1786187" cy="1991003"/>
+            </a:xfrm>
+            <a:prstGeom prst="rect">
+              <a:avLst/>
+            </a:prstGeom>
+          </p:spPr>
+        </p:pic>
+        <p:sp>
+          <p:nvSpPr>
+            <p:cNvPr id="14" name="TextBox 13">
+              <a:extLst>
+                <a:ext uri="{FF2B5EF4-FFF2-40B4-BE49-F238E27FC236}">
+                  <a16:creationId xmlns:a16="http://schemas.microsoft.com/office/drawing/2014/main" id="{907CE242-E61B-B623-ED6F-6BAD75B907CC}"/>
+                </a:ext>
+              </a:extLst>
+            </p:cNvPr>
+            <p:cNvSpPr txBox="1"/>
+            <p:nvPr/>
+          </p:nvSpPr>
+          <p:spPr>
+            <a:xfrm>
+              <a:off x="2340319" y="2980376"/>
+              <a:ext cx="1265859" cy="246221"/>
+            </a:xfrm>
+            <a:prstGeom prst="rect">
+              <a:avLst/>
+            </a:prstGeom>
+            <a:noFill/>
+          </p:spPr>
+          <p:txBody>
+            <a:bodyPr wrap="square" rtlCol="0">
+              <a:spAutoFit/>
+            </a:bodyPr>
+            <a:lstStyle/>
+            <a:p>
+              <a:pPr algn="ctr"/>
+              <a:r>
+                <a:rPr lang="en-US" sz="1000" dirty="0"/>
+                <a:t>Anxiety</a:t>
+              </a:r>
+              <a:endParaRPr lang="en-IL" sz="1000" dirty="0"/>
+            </a:p>
+          </p:txBody>
+        </p:sp>
+      </p:grpSp>
     </p:spTree>
     <p:extLst>
       <p:ext uri="{BB962C8B-B14F-4D97-AF65-F5344CB8AC3E}">
@@ -7587,6 +7835,36 @@
           <a:chExt cx="0" cy="0"/>
         </a:xfrm>
       </p:grpSpPr>
+      <p:pic>
+        <p:nvPicPr>
+          <p:cNvPr id="9" name="Picture 8">
+            <a:extLst>
+              <a:ext uri="{FF2B5EF4-FFF2-40B4-BE49-F238E27FC236}">
+                <a16:creationId xmlns:a16="http://schemas.microsoft.com/office/drawing/2014/main" id="{71B3F95C-D67C-CA5E-005C-90CB3B60FCDF}"/>
+              </a:ext>
+            </a:extLst>
+          </p:cNvPr>
+          <p:cNvPicPr>
+            <a:picLocks noChangeAspect="1"/>
+          </p:cNvPicPr>
+          <p:nvPr/>
+        </p:nvPicPr>
+        <p:blipFill>
+          <a:blip r:embed="rId2"/>
+          <a:stretch>
+            <a:fillRect/>
+          </a:stretch>
+        </p:blipFill>
+        <p:spPr>
+          <a:xfrm>
+            <a:off x="1092112" y="1510599"/>
+            <a:ext cx="3416476" cy="3397425"/>
+          </a:xfrm>
+          <a:prstGeom prst="rect">
+            <a:avLst/>
+          </a:prstGeom>
+        </p:spPr>
+      </p:pic>
       <p:sp>
         <p:nvSpPr>
           <p:cNvPr id="2" name="Title 1">
@@ -7605,84 +7883,38 @@
         </p:nvSpPr>
         <p:spPr>
           <a:xfrm>
-            <a:off x="311700" y="168670"/>
-            <a:ext cx="8520600" cy="572700"/>
+            <a:off x="311700" y="5389"/>
+            <a:ext cx="8520600" cy="865970"/>
           </a:xfrm>
         </p:spPr>
         <p:txBody>
           <a:bodyPr>
-            <a:normAutofit/>
+            <a:noAutofit/>
           </a:bodyPr>
           <a:lstStyle/>
           <a:p>
             <a:pPr algn="ctr"/>
             <a:r>
-              <a:rPr lang="en-US" sz="2300" dirty="0"/>
-              <a:t>Patient-level correlation between physical and mental scores</a:t>
+              <a:rPr lang="en-US" sz="2000" dirty="0"/>
+              <a:t>Patient-level association between exercise-induced </a:t>
             </a:r>
+            <a:br>
+              <a:rPr lang="en-US" sz="2000" dirty="0"/>
+            </a:br>
+            <a:r>
+              <a:rPr lang="en-US" sz="2000" dirty="0"/>
+              <a:t>improvements in VO2MAX and Depression Score</a:t>
+            </a:r>
+            <a:endParaRPr lang="en-US" sz="2000" dirty="0">
+              <a:solidFill>
+                <a:schemeClr val="bg1">
+                  <a:lumMod val="65000"/>
+                </a:schemeClr>
+              </a:solidFill>
+            </a:endParaRPr>
           </a:p>
         </p:txBody>
       </p:sp>
-      <p:pic>
-        <p:nvPicPr>
-          <p:cNvPr id="15" name="Picture 14">
-            <a:extLst>
-              <a:ext uri="{FF2B5EF4-FFF2-40B4-BE49-F238E27FC236}">
-                <a16:creationId xmlns:a16="http://schemas.microsoft.com/office/drawing/2014/main" id="{1EBAA51C-E891-7CCD-F0FC-17A4A6742556}"/>
-              </a:ext>
-            </a:extLst>
-          </p:cNvPr>
-          <p:cNvPicPr>
-            <a:picLocks noChangeAspect="1"/>
-          </p:cNvPicPr>
-          <p:nvPr/>
-        </p:nvPicPr>
-        <p:blipFill>
-          <a:blip r:embed="rId2"/>
-          <a:stretch>
-            <a:fillRect/>
-          </a:stretch>
-        </p:blipFill>
-        <p:spPr>
-          <a:xfrm>
-            <a:off x="5522258" y="1525866"/>
-            <a:ext cx="3179989" cy="3416640"/>
-          </a:xfrm>
-          <a:prstGeom prst="rect">
-            <a:avLst/>
-          </a:prstGeom>
-        </p:spPr>
-      </p:pic>
-      <p:pic>
-        <p:nvPicPr>
-          <p:cNvPr id="17" name="Picture 16">
-            <a:extLst>
-              <a:ext uri="{FF2B5EF4-FFF2-40B4-BE49-F238E27FC236}">
-                <a16:creationId xmlns:a16="http://schemas.microsoft.com/office/drawing/2014/main" id="{A13E8BC9-55FF-B3FB-EBC3-CA44C06EBCE4}"/>
-              </a:ext>
-            </a:extLst>
-          </p:cNvPr>
-          <p:cNvPicPr>
-            <a:picLocks noChangeAspect="1"/>
-          </p:cNvPicPr>
-          <p:nvPr/>
-        </p:nvPicPr>
-        <p:blipFill>
-          <a:blip r:embed="rId3"/>
-          <a:stretch>
-            <a:fillRect/>
-          </a:stretch>
-        </p:blipFill>
-        <p:spPr>
-          <a:xfrm>
-            <a:off x="1392011" y="1525866"/>
-            <a:ext cx="3179989" cy="3387058"/>
-          </a:xfrm>
-          <a:prstGeom prst="rect">
-            <a:avLst/>
-          </a:prstGeom>
-        </p:spPr>
-      </p:pic>
       <p:grpSp>
         <p:nvGrpSpPr>
           <p:cNvPr id="7" name="Group 6">
@@ -7697,10 +7929,10 @@
         </p:nvGrpSpPr>
         <p:grpSpPr>
           <a:xfrm>
-            <a:off x="71599" y="775983"/>
-            <a:ext cx="2465616" cy="1330403"/>
-            <a:chOff x="71599" y="775983"/>
-            <a:chExt cx="2465616" cy="1330403"/>
+            <a:off x="71599" y="808639"/>
+            <a:ext cx="3188153" cy="1297747"/>
+            <a:chOff x="71599" y="808639"/>
+            <a:chExt cx="3188153" cy="1297747"/>
           </a:xfrm>
         </p:grpSpPr>
         <p:sp>
@@ -7717,8 +7949,8 @@
           </p:nvSpPr>
           <p:spPr>
             <a:xfrm>
-              <a:off x="71599" y="1034640"/>
-              <a:ext cx="2465615" cy="307777"/>
+              <a:off x="71599" y="1067296"/>
+              <a:ext cx="3030830" cy="276999"/>
             </a:xfrm>
             <a:prstGeom prst="rect">
               <a:avLst/>
@@ -7732,14 +7964,14 @@
             <a:lstStyle/>
             <a:p>
               <a:r>
-                <a:rPr lang="en-US" dirty="0">
+                <a:rPr lang="en-US" sz="1200" dirty="0">
                   <a:solidFill>
                     <a:srgbClr val="FF0000"/>
                   </a:solidFill>
                 </a:rPr>
-                <a:t>Control: p (upper-left)= 0.2</a:t>
+                <a:t>Control: p (upper-left)   = 4/20 = 0.2</a:t>
               </a:r>
-              <a:endParaRPr lang="en-IL" dirty="0">
+              <a:endParaRPr lang="en-IL" sz="1200" dirty="0">
                 <a:solidFill>
                   <a:srgbClr val="FF0000"/>
                 </a:solidFill>
@@ -7761,8 +7993,8 @@
           </p:nvSpPr>
           <p:spPr>
             <a:xfrm>
-              <a:off x="71600" y="775983"/>
-              <a:ext cx="2465615" cy="307777"/>
+              <a:off x="79763" y="808639"/>
+              <a:ext cx="3179989" cy="276999"/>
             </a:xfrm>
             <a:prstGeom prst="rect">
               <a:avLst/>
@@ -7776,14 +8008,14 @@
             <a:lstStyle/>
             <a:p>
               <a:r>
-                <a:rPr lang="en-US" dirty="0">
+                <a:rPr lang="en-US" sz="1200" dirty="0">
                   <a:solidFill>
                     <a:srgbClr val="00B050"/>
                   </a:solidFill>
                 </a:rPr>
-                <a:t>Exercise: p (upper-left)= 0.7</a:t>
+                <a:t>Exercise: p (upper-left) = 14/20 = 0.7</a:t>
               </a:r>
-              <a:endParaRPr lang="en-IL" dirty="0">
+              <a:endParaRPr lang="en-IL" sz="1200" dirty="0">
                 <a:solidFill>
                   <a:srgbClr val="00B050"/>
                 </a:solidFill>
@@ -7800,13 +8032,15 @@
                 </a:ext>
               </a:extLst>
             </p:cNvPr>
-            <p:cNvCxnSpPr/>
+            <p:cNvCxnSpPr>
+              <a:cxnSpLocks/>
+            </p:cNvCxnSpPr>
             <p:nvPr/>
           </p:nvCxnSpPr>
           <p:spPr>
             <a:xfrm>
-              <a:off x="873579" y="1436914"/>
-              <a:ext cx="1232807" cy="669472"/>
+              <a:off x="1350250" y="1342417"/>
+              <a:ext cx="519372" cy="763969"/>
             </a:xfrm>
             <a:prstGeom prst="straightConnector1">
               <a:avLst/>
@@ -7830,6 +8064,315 @@
             </a:fontRef>
           </p:style>
         </p:cxnSp>
+      </p:grpSp>
+      <p:sp>
+        <p:nvSpPr>
+          <p:cNvPr id="21" name="Rectangle 20">
+            <a:extLst>
+              <a:ext uri="{FF2B5EF4-FFF2-40B4-BE49-F238E27FC236}">
+                <a16:creationId xmlns:a16="http://schemas.microsoft.com/office/drawing/2014/main" id="{FB3AA800-28C1-7461-A684-512B529BDCA7}"/>
+              </a:ext>
+            </a:extLst>
+          </p:cNvPr>
+          <p:cNvSpPr/>
+          <p:nvPr/>
+        </p:nvSpPr>
+        <p:spPr>
+          <a:xfrm>
+            <a:off x="1681843" y="1536001"/>
+            <a:ext cx="2707400" cy="221335"/>
+          </a:xfrm>
+          <a:prstGeom prst="rect">
+            <a:avLst/>
+          </a:prstGeom>
+          <a:solidFill>
+            <a:srgbClr val="FFFF00">
+              <a:alpha val="25000"/>
+            </a:srgbClr>
+          </a:solidFill>
+          <a:ln>
+            <a:noFill/>
+          </a:ln>
+        </p:spPr>
+        <p:style>
+          <a:lnRef idx="2">
+            <a:schemeClr val="accent1">
+              <a:shade val="15000"/>
+            </a:schemeClr>
+          </a:lnRef>
+          <a:fillRef idx="1">
+            <a:schemeClr val="accent1"/>
+          </a:fillRef>
+          <a:effectRef idx="0">
+            <a:schemeClr val="accent1"/>
+          </a:effectRef>
+          <a:fontRef idx="minor">
+            <a:schemeClr val="lt1"/>
+          </a:fontRef>
+        </p:style>
+        <p:txBody>
+          <a:bodyPr rtlCol="0" anchor="ctr"/>
+          <a:lstStyle/>
+          <a:p>
+            <a:pPr algn="ctr"/>
+            <a:endParaRPr lang="en-IL"/>
+          </a:p>
+        </p:txBody>
+      </p:sp>
+      <p:grpSp>
+        <p:nvGrpSpPr>
+          <p:cNvPr id="24" name="Group 23">
+            <a:extLst>
+              <a:ext uri="{FF2B5EF4-FFF2-40B4-BE49-F238E27FC236}">
+                <a16:creationId xmlns:a16="http://schemas.microsoft.com/office/drawing/2014/main" id="{32CD9590-1AB3-86F3-7753-C2736EB465E0}"/>
+              </a:ext>
+            </a:extLst>
+          </p:cNvPr>
+          <p:cNvGrpSpPr/>
+          <p:nvPr/>
+        </p:nvGrpSpPr>
+        <p:grpSpPr>
+          <a:xfrm>
+            <a:off x="4381079" y="849459"/>
+            <a:ext cx="4336196" cy="4058565"/>
+            <a:chOff x="4381079" y="849459"/>
+            <a:chExt cx="4336196" cy="4058565"/>
+          </a:xfrm>
+        </p:grpSpPr>
+        <p:pic>
+          <p:nvPicPr>
+            <p:cNvPr id="11" name="Picture 10">
+              <a:extLst>
+                <a:ext uri="{FF2B5EF4-FFF2-40B4-BE49-F238E27FC236}">
+                  <a16:creationId xmlns:a16="http://schemas.microsoft.com/office/drawing/2014/main" id="{D6A129AD-33C8-2E9F-7045-3EBAD4E6BBE2}"/>
+                </a:ext>
+              </a:extLst>
+            </p:cNvPr>
+            <p:cNvPicPr>
+              <a:picLocks noChangeAspect="1"/>
+            </p:cNvPicPr>
+            <p:nvPr/>
+          </p:nvPicPr>
+          <p:blipFill>
+            <a:blip r:embed="rId3"/>
+            <a:stretch>
+              <a:fillRect/>
+            </a:stretch>
+          </p:blipFill>
+          <p:spPr>
+            <a:xfrm>
+              <a:off x="5357952" y="1536001"/>
+              <a:ext cx="3359323" cy="3372023"/>
+            </a:xfrm>
+            <a:prstGeom prst="rect">
+              <a:avLst/>
+            </a:prstGeom>
+          </p:spPr>
+        </p:pic>
+        <p:grpSp>
+          <p:nvGrpSpPr>
+            <p:cNvPr id="14" name="Group 13">
+              <a:extLst>
+                <a:ext uri="{FF2B5EF4-FFF2-40B4-BE49-F238E27FC236}">
+                  <a16:creationId xmlns:a16="http://schemas.microsoft.com/office/drawing/2014/main" id="{66BA3E0E-7609-B19B-12F6-CED53F84071A}"/>
+                </a:ext>
+              </a:extLst>
+            </p:cNvPr>
+            <p:cNvGrpSpPr/>
+            <p:nvPr/>
+          </p:nvGrpSpPr>
+          <p:grpSpPr>
+            <a:xfrm>
+              <a:off x="4381079" y="849459"/>
+              <a:ext cx="3179990" cy="1256927"/>
+              <a:chOff x="71598" y="849459"/>
+              <a:chExt cx="3179990" cy="1256927"/>
+            </a:xfrm>
+          </p:grpSpPr>
+          <p:sp>
+            <p:nvSpPr>
+              <p:cNvPr id="16" name="TextBox 15">
+                <a:extLst>
+                  <a:ext uri="{FF2B5EF4-FFF2-40B4-BE49-F238E27FC236}">
+                    <a16:creationId xmlns:a16="http://schemas.microsoft.com/office/drawing/2014/main" id="{67245533-16F6-E05D-58F2-830BEB9355DB}"/>
+                  </a:ext>
+                </a:extLst>
+              </p:cNvPr>
+              <p:cNvSpPr txBox="1"/>
+              <p:nvPr/>
+            </p:nvSpPr>
+            <p:spPr>
+              <a:xfrm>
+                <a:off x="71598" y="1059132"/>
+                <a:ext cx="3179989" cy="246221"/>
+              </a:xfrm>
+              <a:prstGeom prst="rect">
+                <a:avLst/>
+              </a:prstGeom>
+              <a:noFill/>
+            </p:spPr>
+            <p:txBody>
+              <a:bodyPr wrap="square" rtlCol="0">
+                <a:spAutoFit/>
+              </a:bodyPr>
+              <a:lstStyle/>
+              <a:p>
+                <a:r>
+                  <a:rPr lang="en-US" sz="1000" dirty="0">
+                    <a:solidFill>
+                      <a:srgbClr val="FF0000"/>
+                    </a:solidFill>
+                  </a:rPr>
+                  <a:t>Control: p (upper-left)   = 7/20 = 0.35</a:t>
+                </a:r>
+                <a:endParaRPr lang="en-IL" sz="1000" dirty="0">
+                  <a:solidFill>
+                    <a:srgbClr val="FF0000"/>
+                  </a:solidFill>
+                </a:endParaRPr>
+              </a:p>
+            </p:txBody>
+          </p:sp>
+          <p:sp>
+            <p:nvSpPr>
+              <p:cNvPr id="18" name="TextBox 17">
+                <a:extLst>
+                  <a:ext uri="{FF2B5EF4-FFF2-40B4-BE49-F238E27FC236}">
+                    <a16:creationId xmlns:a16="http://schemas.microsoft.com/office/drawing/2014/main" id="{6D8DF82D-BA5D-41E5-27D8-01778047A8DB}"/>
+                  </a:ext>
+                </a:extLst>
+              </p:cNvPr>
+              <p:cNvSpPr txBox="1"/>
+              <p:nvPr/>
+            </p:nvSpPr>
+            <p:spPr>
+              <a:xfrm>
+                <a:off x="71599" y="849459"/>
+                <a:ext cx="3179989" cy="246221"/>
+              </a:xfrm>
+              <a:prstGeom prst="rect">
+                <a:avLst/>
+              </a:prstGeom>
+              <a:noFill/>
+            </p:spPr>
+            <p:txBody>
+              <a:bodyPr wrap="square" rtlCol="0">
+                <a:spAutoFit/>
+              </a:bodyPr>
+              <a:lstStyle/>
+              <a:p>
+                <a:r>
+                  <a:rPr lang="en-US" sz="1000" dirty="0">
+                    <a:solidFill>
+                      <a:srgbClr val="00B050"/>
+                    </a:solidFill>
+                  </a:rPr>
+                  <a:t>Exercise: p (upper-left) = 7/20 = 0.35</a:t>
+                </a:r>
+                <a:endParaRPr lang="en-IL" sz="1000" dirty="0">
+                  <a:solidFill>
+                    <a:srgbClr val="00B050"/>
+                  </a:solidFill>
+                </a:endParaRPr>
+              </a:p>
+            </p:txBody>
+          </p:sp>
+          <p:cxnSp>
+            <p:nvCxnSpPr>
+              <p:cNvPr id="19" name="Straight Arrow Connector 18">
+                <a:extLst>
+                  <a:ext uri="{FF2B5EF4-FFF2-40B4-BE49-F238E27FC236}">
+                    <a16:creationId xmlns:a16="http://schemas.microsoft.com/office/drawing/2014/main" id="{7E3BF035-7E4E-401F-B102-E091719C1D38}"/>
+                  </a:ext>
+                </a:extLst>
+              </p:cNvPr>
+              <p:cNvCxnSpPr>
+                <a:cxnSpLocks/>
+              </p:cNvCxnSpPr>
+              <p:nvPr/>
+            </p:nvCxnSpPr>
+            <p:spPr>
+              <a:xfrm>
+                <a:off x="1350250" y="1342417"/>
+                <a:ext cx="519372" cy="763969"/>
+              </a:xfrm>
+              <a:prstGeom prst="straightConnector1">
+                <a:avLst/>
+              </a:prstGeom>
+              <a:ln>
+                <a:tailEnd type="triangle"/>
+              </a:ln>
+            </p:spPr>
+            <p:style>
+              <a:lnRef idx="1">
+                <a:schemeClr val="accent1"/>
+              </a:lnRef>
+              <a:fillRef idx="0">
+                <a:schemeClr val="accent1"/>
+              </a:fillRef>
+              <a:effectRef idx="0">
+                <a:schemeClr val="accent1"/>
+              </a:effectRef>
+              <a:fontRef idx="minor">
+                <a:schemeClr val="tx1"/>
+              </a:fontRef>
+            </p:style>
+          </p:cxnSp>
+        </p:grpSp>
+        <p:sp>
+          <p:nvSpPr>
+            <p:cNvPr id="23" name="Rectangle 22">
+              <a:extLst>
+                <a:ext uri="{FF2B5EF4-FFF2-40B4-BE49-F238E27FC236}">
+                  <a16:creationId xmlns:a16="http://schemas.microsoft.com/office/drawing/2014/main" id="{83C14B5A-15BE-5AE8-E835-D23AC12CB286}"/>
+                </a:ext>
+              </a:extLst>
+            </p:cNvPr>
+            <p:cNvSpPr/>
+            <p:nvPr/>
+          </p:nvSpPr>
+          <p:spPr>
+            <a:xfrm>
+              <a:off x="5957208" y="1534886"/>
+              <a:ext cx="2556000" cy="219729"/>
+            </a:xfrm>
+            <a:prstGeom prst="rect">
+              <a:avLst/>
+            </a:prstGeom>
+            <a:solidFill>
+              <a:srgbClr val="FFFF00">
+                <a:alpha val="25000"/>
+              </a:srgbClr>
+            </a:solidFill>
+            <a:ln>
+              <a:noFill/>
+            </a:ln>
+          </p:spPr>
+          <p:style>
+            <a:lnRef idx="2">
+              <a:schemeClr val="accent1">
+                <a:shade val="15000"/>
+              </a:schemeClr>
+            </a:lnRef>
+            <a:fillRef idx="1">
+              <a:schemeClr val="accent1"/>
+            </a:fillRef>
+            <a:effectRef idx="0">
+              <a:schemeClr val="accent1"/>
+            </a:effectRef>
+            <a:fontRef idx="minor">
+              <a:schemeClr val="lt1"/>
+            </a:fontRef>
+          </p:style>
+          <p:txBody>
+            <a:bodyPr rtlCol="0" anchor="ctr"/>
+            <a:lstStyle/>
+            <a:p>
+              <a:pPr algn="ctr"/>
+              <a:endParaRPr lang="en-IL"/>
+            </a:p>
+          </p:txBody>
+        </p:sp>
       </p:grpSp>
     </p:spTree>
     <p:extLst>
@@ -7876,6 +8419,51 @@
                                         </p:cTn>
                                         <p:tgtEl>
                                           <p:spTgt spid="7"/>
+                                        </p:tgtEl>
+                                        <p:attrNameLst>
+                                          <p:attrName>style.visibility</p:attrName>
+                                        </p:attrNameLst>
+                                      </p:cBhvr>
+                                      <p:to>
+                                        <p:strVal val="visible"/>
+                                      </p:to>
+                                    </p:set>
+                                  </p:childTnLst>
+                                </p:cTn>
+                              </p:par>
+                            </p:childTnLst>
+                          </p:cTn>
+                        </p:par>
+                      </p:childTnLst>
+                    </p:cTn>
+                  </p:par>
+                  <p:par>
+                    <p:cTn id="7" fill="hold">
+                      <p:stCondLst>
+                        <p:cond delay="indefinite"/>
+                      </p:stCondLst>
+                      <p:childTnLst>
+                        <p:par>
+                          <p:cTn id="8" fill="hold">
+                            <p:stCondLst>
+                              <p:cond delay="0"/>
+                            </p:stCondLst>
+                            <p:childTnLst>
+                              <p:par>
+                                <p:cTn id="9" presetID="1" presetClass="entr" presetSubtype="0" fill="hold" nodeType="clickEffect">
+                                  <p:stCondLst>
+                                    <p:cond delay="0"/>
+                                  </p:stCondLst>
+                                  <p:childTnLst>
+                                    <p:set>
+                                      <p:cBhvr>
+                                        <p:cTn id="10" dur="1" fill="hold">
+                                          <p:stCondLst>
+                                            <p:cond delay="0"/>
+                                          </p:stCondLst>
+                                        </p:cTn>
+                                        <p:tgtEl>
+                                          <p:spTgt spid="24"/>
                                         </p:tgtEl>
                                         <p:attrNameLst>
                                           <p:attrName>style.visibility</p:attrName>
@@ -7950,8 +8538,8 @@
         </p:nvSpPr>
         <p:spPr>
           <a:xfrm>
-            <a:off x="0" y="218701"/>
-            <a:ext cx="9129307" cy="461665"/>
+            <a:off x="0" y="159016"/>
+            <a:ext cx="9129307" cy="769441"/>
           </a:xfrm>
           <a:prstGeom prst="rect">
             <a:avLst/>
@@ -7966,10 +8554,29 @@
           <a:p>
             <a:pPr algn="ctr"/>
             <a:r>
-              <a:rPr lang="en-US" sz="2400" dirty="0"/>
-              <a:t>Mean Confidence interval of exercise-affected features</a:t>
+              <a:rPr lang="en-US" sz="2200" dirty="0"/>
+              <a:t>Mean Confidence interval (CI) of Exercise-affected </a:t>
             </a:r>
-            <a:endParaRPr lang="en-IL" sz="2400" dirty="0"/>
+          </a:p>
+          <a:p>
+            <a:pPr algn="ctr"/>
+            <a:r>
+              <a:rPr lang="en-US" sz="2200" i="1" dirty="0"/>
+              <a:t>Depression</a:t>
+            </a:r>
+            <a:r>
+              <a:rPr lang="en-US" sz="2200" dirty="0"/>
+              <a:t> and </a:t>
+            </a:r>
+            <a:r>
+              <a:rPr lang="en-US" sz="2200" i="1" dirty="0"/>
+              <a:t>Max. Oxygen Consumption </a:t>
+            </a:r>
+            <a:r>
+              <a:rPr lang="en-US" sz="2200" dirty="0"/>
+              <a:t>features</a:t>
+            </a:r>
+            <a:endParaRPr lang="en-IL" sz="2200" dirty="0"/>
           </a:p>
         </p:txBody>
       </p:sp>
@@ -7987,10 +8594,10 @@
         </p:nvGrpSpPr>
         <p:grpSpPr>
           <a:xfrm>
-            <a:off x="1102179" y="3261880"/>
-            <a:ext cx="6498771" cy="1477815"/>
-            <a:chOff x="1102179" y="861579"/>
-            <a:chExt cx="6498771" cy="1477815"/>
+            <a:off x="929369" y="3262351"/>
+            <a:ext cx="6671581" cy="1477344"/>
+            <a:chOff x="929369" y="862050"/>
+            <a:chExt cx="6671581" cy="1477344"/>
           </a:xfrm>
         </p:grpSpPr>
         <p:pic>
@@ -8245,8 +8852,8 @@
           </p:nvSpPr>
           <p:spPr>
             <a:xfrm>
-              <a:off x="2243819" y="861579"/>
-              <a:ext cx="4124324" cy="338554"/>
+              <a:off x="929369" y="900150"/>
+              <a:ext cx="6671581" cy="307777"/>
             </a:xfrm>
             <a:prstGeom prst="rect">
               <a:avLst/>
@@ -8261,14 +8868,14 @@
             <a:p>
               <a:pPr algn="ctr"/>
               <a:r>
-                <a:rPr lang="en-US" sz="1600" dirty="0">
+                <a:rPr lang="en-US" dirty="0">
                   <a:solidFill>
                     <a:srgbClr val="FFC000"/>
                   </a:solidFill>
                 </a:rPr>
-                <a:t>Stats - VO2MAX score, [after/before] ratio:</a:t>
+                <a:t>Mild overlap between control- &amp; exercise-groups Mean CI VO2MAX score</a:t>
               </a:r>
-              <a:endParaRPr lang="en-IL" sz="1600" dirty="0">
+              <a:endParaRPr lang="en-IL" dirty="0">
                 <a:solidFill>
                   <a:srgbClr val="FFC000"/>
                 </a:solidFill>
@@ -8345,10 +8952,10 @@
         </p:nvGrpSpPr>
         <p:grpSpPr>
           <a:xfrm>
-            <a:off x="1107622" y="1171880"/>
-            <a:ext cx="6498771" cy="1499526"/>
-            <a:chOff x="1107622" y="2698607"/>
-            <a:chExt cx="6498771" cy="1499526"/>
+            <a:off x="976995" y="1194062"/>
+            <a:ext cx="6629398" cy="1477344"/>
+            <a:chOff x="976995" y="2720789"/>
+            <a:chExt cx="6629398" cy="1477344"/>
           </a:xfrm>
         </p:grpSpPr>
         <p:pic>
@@ -8657,8 +9264,8 @@
           </p:nvSpPr>
           <p:spPr>
             <a:xfrm>
-              <a:off x="2005695" y="2698607"/>
-              <a:ext cx="4600572" cy="338554"/>
+              <a:off x="976995" y="2728156"/>
+              <a:ext cx="6470100" cy="307777"/>
             </a:xfrm>
             <a:prstGeom prst="rect">
               <a:avLst/>
@@ -8673,16 +9280,26 @@
             <a:p>
               <a:pPr algn="ctr"/>
               <a:r>
-                <a:rPr lang="en-US" sz="1600" dirty="0">
+                <a:rPr lang="en-US" u="sng" dirty="0">
                   <a:solidFill>
                     <a:schemeClr val="accent4">
                       <a:lumMod val="75000"/>
                     </a:schemeClr>
                   </a:solidFill>
                 </a:rPr>
-                <a:t>Stats - Depression score, [after/before] ratio:</a:t>
+                <a:t>No overlap</a:t>
               </a:r>
-              <a:endParaRPr lang="en-IL" sz="1600" dirty="0">
+              <a:r>
+                <a:rPr lang="en-US" dirty="0">
+                  <a:solidFill>
+                    <a:schemeClr val="accent4">
+                      <a:lumMod val="75000"/>
+                    </a:schemeClr>
+                  </a:solidFill>
+                </a:rPr>
+                <a:t> between control- &amp; exercise-groups Mean CI Depression score</a:t>
+              </a:r>
+              <a:endParaRPr lang="en-IL" dirty="0">
                 <a:solidFill>
                   <a:schemeClr val="accent4">
                     <a:lumMod val="75000"/>
@@ -8703,6 +9320,81 @@
   <p:clrMapOvr>
     <a:masterClrMapping/>
   </p:clrMapOvr>
+  <p:timing>
+    <p:tnLst>
+      <p:par>
+        <p:cTn id="1" dur="indefinite" restart="never" nodeType="tmRoot">
+          <p:childTnLst>
+            <p:seq concurrent="1" nextAc="seek">
+              <p:cTn id="2" dur="indefinite" nodeType="mainSeq">
+                <p:childTnLst>
+                  <p:par>
+                    <p:cTn id="3" fill="hold">
+                      <p:stCondLst>
+                        <p:cond delay="indefinite"/>
+                      </p:stCondLst>
+                      <p:childTnLst>
+                        <p:par>
+                          <p:cTn id="4" fill="hold">
+                            <p:stCondLst>
+                              <p:cond delay="0"/>
+                            </p:stCondLst>
+                            <p:childTnLst>
+                              <p:par>
+                                <p:cTn id="5" presetID="1" presetClass="entr" presetSubtype="0" fill="hold" nodeType="clickEffect">
+                                  <p:stCondLst>
+                                    <p:cond delay="0"/>
+                                  </p:stCondLst>
+                                  <p:childTnLst>
+                                    <p:set>
+                                      <p:cBhvr>
+                                        <p:cTn id="6" dur="1" fill="hold">
+                                          <p:stCondLst>
+                                            <p:cond delay="0"/>
+                                          </p:stCondLst>
+                                        </p:cTn>
+                                        <p:tgtEl>
+                                          <p:spTgt spid="25"/>
+                                        </p:tgtEl>
+                                        <p:attrNameLst>
+                                          <p:attrName>style.visibility</p:attrName>
+                                        </p:attrNameLst>
+                                      </p:cBhvr>
+                                      <p:to>
+                                        <p:strVal val="visible"/>
+                                      </p:to>
+                                    </p:set>
+                                  </p:childTnLst>
+                                </p:cTn>
+                              </p:par>
+                            </p:childTnLst>
+                          </p:cTn>
+                        </p:par>
+                      </p:childTnLst>
+                    </p:cTn>
+                  </p:par>
+                </p:childTnLst>
+              </p:cTn>
+              <p:prevCondLst>
+                <p:cond evt="onPrev" delay="0">
+                  <p:tgtEl>
+                    <p:sldTgt/>
+                  </p:tgtEl>
+                </p:cond>
+              </p:prevCondLst>
+              <p:nextCondLst>
+                <p:cond evt="onNext" delay="0">
+                  <p:tgtEl>
+                    <p:sldTgt/>
+                  </p:tgtEl>
+                </p:cond>
+              </p:nextCondLst>
+            </p:seq>
+          </p:childTnLst>
+        </p:cTn>
+      </p:par>
+    </p:tnLst>
+  </p:timing>
 </p:sld>
 </file>
 
@@ -8896,7 +9588,7 @@
             </a:pPr>
             <a:r>
               <a:rPr lang="en-US" dirty="0"/>
-              <a:t>Surprisingly, exercise activity does NOT seem to affect any of the other 7 mental scores</a:t>
+              <a:t>Exercise activity does NOT seem to affect any of the other 7 anxiety/depression scores</a:t>
             </a:r>
           </a:p>
           <a:p>
@@ -10373,10 +11065,10 @@
               <a:buAutoNum type="arabicPeriod"/>
             </a:pPr>
             <a:r>
-              <a:rPr lang="iw"/>
+              <a:rPr lang="iw" dirty="0"/>
               <a:t>Mental examinations:</a:t>
             </a:r>
-            <a:endParaRPr/>
+            <a:endParaRPr dirty="0"/>
           </a:p>
           <a:p>
             <a:pPr marL="990000" lvl="1" indent="-310832" algn="l" rtl="0">
@@ -10390,26 +11082,26 @@
               <a:buAutoNum type="alphaLcPeriod"/>
             </a:pPr>
             <a:r>
-              <a:rPr lang="iw"/>
+              <a:rPr lang="iw" dirty="0"/>
               <a:t>The primary outcome was the Hospital Anxiety Depression Scale for evaluation of depression (</a:t>
             </a:r>
             <a:r>
-              <a:rPr lang="iw" b="1"/>
+              <a:rPr lang="iw" b="1" dirty="0"/>
               <a:t>HADS-D</a:t>
             </a:r>
             <a:r>
-              <a:rPr lang="iw"/>
+              <a:rPr lang="iw" dirty="0"/>
               <a:t>) and anxiety (</a:t>
             </a:r>
             <a:r>
-              <a:rPr lang="iw" b="1"/>
+              <a:rPr lang="iw" b="1" dirty="0"/>
               <a:t>HADS-A</a:t>
             </a:r>
             <a:r>
-              <a:rPr lang="iw"/>
+              <a:rPr lang="iw" dirty="0"/>
               <a:t>) symptoms. </a:t>
             </a:r>
-            <a:endParaRPr/>
+            <a:endParaRPr dirty="0"/>
           </a:p>
           <a:p>
             <a:pPr marL="990000" lvl="1" indent="-310832" algn="l" rtl="0">
@@ -10423,14 +11115,14 @@
               <a:buAutoNum type="alphaLcPeriod"/>
             </a:pPr>
             <a:r>
-              <a:rPr lang="iw" b="1"/>
+              <a:rPr lang="iw" b="1" dirty="0"/>
               <a:t>SDS</a:t>
             </a:r>
             <a:r>
-              <a:rPr lang="iw"/>
+              <a:rPr lang="iw" dirty="0"/>
               <a:t>: Secondary outcomes were psychological self-assessments (The Zung Self-Assessment Depression Scale</a:t>
             </a:r>
-            <a:endParaRPr/>
+            <a:endParaRPr dirty="0"/>
           </a:p>
           <a:p>
             <a:pPr marL="990000" lvl="1" indent="-310832" algn="l" rtl="0">
@@ -10444,14 +11136,14 @@
               <a:buAutoNum type="alphaLcPeriod"/>
             </a:pPr>
             <a:r>
-              <a:rPr lang="iw" b="1"/>
+              <a:rPr lang="iw" b="1" dirty="0"/>
               <a:t>BDI-13</a:t>
             </a:r>
             <a:r>
-              <a:rPr lang="iw"/>
+              <a:rPr lang="iw" dirty="0"/>
               <a:t>: Beck’s abbreviated Depression Inventory</a:t>
             </a:r>
-            <a:endParaRPr/>
+            <a:endParaRPr dirty="0"/>
           </a:p>
           <a:p>
             <a:pPr marL="990000" lvl="1" indent="-310832" algn="l" rtl="0">
@@ -10465,14 +11157,14 @@
               <a:buAutoNum type="alphaLcPeriod"/>
             </a:pPr>
             <a:r>
-              <a:rPr lang="iw" b="1"/>
+              <a:rPr lang="iw" b="1" dirty="0"/>
               <a:t>CDI</a:t>
             </a:r>
             <a:r>
-              <a:rPr lang="iw"/>
+              <a:rPr lang="iw" dirty="0"/>
               <a:t>: The Child Depression Inventory</a:t>
             </a:r>
-            <a:endParaRPr/>
+            <a:endParaRPr dirty="0"/>
           </a:p>
           <a:p>
             <a:pPr marL="990000" lvl="1" indent="-310832" algn="l" rtl="0">
@@ -10486,14 +11178,14 @@
               <a:buAutoNum type="alphaLcPeriod"/>
             </a:pPr>
             <a:r>
-              <a:rPr lang="iw" b="1"/>
+              <a:rPr lang="iw" b="1" dirty="0"/>
               <a:t>STAI</a:t>
             </a:r>
             <a:r>
-              <a:rPr lang="iw"/>
+              <a:rPr lang="iw" dirty="0"/>
               <a:t>: The State-Trait Anxiety Inventory</a:t>
             </a:r>
-            <a:endParaRPr/>
+            <a:endParaRPr dirty="0"/>
           </a:p>
           <a:p>
             <a:pPr marL="990000" lvl="1" indent="-310832" algn="l" rtl="0">
@@ -10507,14 +11199,14 @@
               <a:buAutoNum type="alphaLcPeriod"/>
             </a:pPr>
             <a:r>
-              <a:rPr lang="iw" b="1"/>
+              <a:rPr lang="iw" b="1" dirty="0"/>
               <a:t>HAM-D</a:t>
             </a:r>
             <a:r>
-              <a:rPr lang="iw"/>
+              <a:rPr lang="iw" dirty="0"/>
               <a:t>: Depression Diagnostic interview score</a:t>
             </a:r>
-            <a:endParaRPr/>
+            <a:endParaRPr dirty="0"/>
           </a:p>
           <a:p>
             <a:pPr marL="457200" lvl="0" indent="-334327" algn="l" rtl="0">
@@ -10528,10 +11220,10 @@
               <a:buAutoNum type="arabicPeriod"/>
             </a:pPr>
             <a:r>
-              <a:rPr lang="iw"/>
+              <a:rPr lang="iw" dirty="0"/>
               <a:t>Physical examinations: </a:t>
             </a:r>
-            <a:endParaRPr/>
+            <a:endParaRPr dirty="0"/>
           </a:p>
           <a:p>
             <a:pPr marL="990000" lvl="1" indent="-310832" algn="l" rtl="0">
@@ -10545,11 +11237,11 @@
               <a:buAutoNum type="alphaLcPeriod"/>
             </a:pPr>
             <a:r>
-              <a:rPr lang="iw" b="1"/>
+              <a:rPr lang="iw" b="1" dirty="0"/>
               <a:t>VO2 max</a:t>
             </a:r>
             <a:r>
-              <a:rPr lang="iw" sz="1050">
+              <a:rPr lang="iw" sz="1050" dirty="0">
                 <a:solidFill>
                   <a:schemeClr val="accent2"/>
                 </a:solidFill>
@@ -10564,10 +11256,10 @@
               <a:t>: </a:t>
             </a:r>
             <a:r>
-              <a:rPr lang="iw"/>
+              <a:rPr lang="iw" dirty="0"/>
               <a:t>physical effort Test (Indication to cardiorespiratory fitness - the higher the better)</a:t>
             </a:r>
-            <a:endParaRPr/>
+            <a:endParaRPr dirty="0"/>
           </a:p>
           <a:p>
             <a:pPr marL="990000" lvl="1" indent="-310832" algn="l" rtl="0">
@@ -10581,14 +11273,14 @@
               <a:buAutoNum type="alphaLcPeriod"/>
             </a:pPr>
             <a:r>
-              <a:rPr lang="iw" b="1"/>
+              <a:rPr lang="iw" b="1" dirty="0"/>
               <a:t>BMI </a:t>
             </a:r>
             <a:r>
-              <a:rPr lang="iw"/>
+              <a:rPr lang="iw" dirty="0"/>
               <a:t>(Body Mass Index - the lower the better)</a:t>
             </a:r>
-            <a:endParaRPr/>
+            <a:endParaRPr dirty="0"/>
           </a:p>
           <a:p>
             <a:pPr marL="990000" lvl="1" indent="-310832" algn="l" rtl="0">
@@ -10602,14 +11294,14 @@
               <a:buAutoNum type="alphaLcPeriod"/>
             </a:pPr>
             <a:r>
-              <a:rPr lang="iw" b="1"/>
+              <a:rPr lang="iw" b="1" dirty="0"/>
               <a:t>Weight </a:t>
             </a:r>
             <a:r>
-              <a:rPr lang="iw"/>
+              <a:rPr lang="iw" dirty="0"/>
               <a:t>(The lower the better)</a:t>
             </a:r>
-            <a:endParaRPr/>
+            <a:endParaRPr dirty="0"/>
           </a:p>
         </p:txBody>
       </p:sp>
@@ -10803,7 +11495,7 @@
         </p:spPr>
         <p:txBody>
           <a:bodyPr spcFirstLastPara="1" wrap="square" lIns="91425" tIns="91425" rIns="91425" bIns="91425" anchor="t" anchorCtr="0">
-            <a:normAutofit fontScale="92500"/>
+            <a:normAutofit fontScale="85000" lnSpcReduction="10000"/>
           </a:bodyPr>
           <a:lstStyle>
             <a:defPPr marR="0" lvl="0" algn="l" rtl="0">
@@ -11060,7 +11752,7 @@
             </a:pPr>
             <a:r>
               <a:rPr lang="en-US" dirty="0"/>
-              <a:t>Examine the impact of physical exercise on the mental condition of trial members</a:t>
+              <a:t>Examine possible impact of physical exercise on participants’ anxiety &amp; depression scores</a:t>
             </a:r>
           </a:p>
         </p:txBody>

</xml_diff>